<commit_message>
Updated Deliverable and Communication
</commit_message>
<xml_diff>
--- a/Deliverables/Iteration 2/Presentation/Iteration2.pptx
+++ b/Deliverables/Iteration 2/Presentation/Iteration2.pptx
@@ -248,7 +248,7 @@
           <a:p>
             <a:fld id="{C1C164F1-18C8-4802-A597-835F9C0DBFDD}" type="datetimeFigureOut">
               <a:rPr lang="en-US" smtClean="0"/>
-              <a:t>10/29/2013</a:t>
+              <a:t>10/30/2013</a:t>
             </a:fld>
             <a:endParaRPr lang="en-US"/>
           </a:p>
@@ -561,7 +561,7 @@
           <a:p>
             <a:fld id="{C1C164F1-18C8-4802-A597-835F9C0DBFDD}" type="datetimeFigureOut">
               <a:rPr lang="en-US" smtClean="0"/>
-              <a:t>10/29/2013</a:t>
+              <a:t>10/30/2013</a:t>
             </a:fld>
             <a:endParaRPr lang="en-US"/>
           </a:p>
@@ -746,7 +746,7 @@
           <a:p>
             <a:fld id="{C1C164F1-18C8-4802-A597-835F9C0DBFDD}" type="datetimeFigureOut">
               <a:rPr lang="en-US" smtClean="0"/>
-              <a:t>10/29/2013</a:t>
+              <a:t>10/30/2013</a:t>
             </a:fld>
             <a:endParaRPr lang="en-US"/>
           </a:p>
@@ -921,7 +921,7 @@
           <a:p>
             <a:fld id="{C1C164F1-18C8-4802-A597-835F9C0DBFDD}" type="datetimeFigureOut">
               <a:rPr lang="en-US" smtClean="0"/>
-              <a:t>10/29/2013</a:t>
+              <a:t>10/30/2013</a:t>
             </a:fld>
             <a:endParaRPr lang="en-US"/>
           </a:p>
@@ -1189,7 +1189,7 @@
           <a:p>
             <a:fld id="{C1C164F1-18C8-4802-A597-835F9C0DBFDD}" type="datetimeFigureOut">
               <a:rPr lang="en-US" smtClean="0"/>
-              <a:t>10/29/2013</a:t>
+              <a:t>10/30/2013</a:t>
             </a:fld>
             <a:endParaRPr lang="en-US"/>
           </a:p>
@@ -1657,7 +1657,7 @@
           <a:p>
             <a:fld id="{C1C164F1-18C8-4802-A597-835F9C0DBFDD}" type="datetimeFigureOut">
               <a:rPr lang="en-US" smtClean="0"/>
-              <a:t>10/29/2013</a:t>
+              <a:t>10/30/2013</a:t>
             </a:fld>
             <a:endParaRPr lang="en-US"/>
           </a:p>
@@ -2146,7 +2146,7 @@
           <a:p>
             <a:fld id="{C1C164F1-18C8-4802-A597-835F9C0DBFDD}" type="datetimeFigureOut">
               <a:rPr lang="en-US" smtClean="0"/>
-              <a:t>10/29/2013</a:t>
+              <a:t>10/30/2013</a:t>
             </a:fld>
             <a:endParaRPr lang="en-US"/>
           </a:p>
@@ -2272,7 +2272,7 @@
           <a:p>
             <a:fld id="{C1C164F1-18C8-4802-A597-835F9C0DBFDD}" type="datetimeFigureOut">
               <a:rPr lang="en-US" smtClean="0"/>
-              <a:t>10/29/2013</a:t>
+              <a:t>10/30/2013</a:t>
             </a:fld>
             <a:endParaRPr lang="en-US"/>
           </a:p>
@@ -2416,7 +2416,7 @@
           <a:p>
             <a:fld id="{C1C164F1-18C8-4802-A597-835F9C0DBFDD}" type="datetimeFigureOut">
               <a:rPr lang="en-US" smtClean="0"/>
-              <a:t>10/29/2013</a:t>
+              <a:t>10/30/2013</a:t>
             </a:fld>
             <a:endParaRPr lang="en-US"/>
           </a:p>
@@ -2738,7 +2738,7 @@
           <a:p>
             <a:fld id="{C1C164F1-18C8-4802-A597-835F9C0DBFDD}" type="datetimeFigureOut">
               <a:rPr lang="en-US" smtClean="0"/>
-              <a:t>10/29/2013</a:t>
+              <a:t>10/30/2013</a:t>
             </a:fld>
             <a:endParaRPr lang="en-US"/>
           </a:p>
@@ -2872,7 +2872,7 @@
           <a:p>
             <a:fld id="{C1C164F1-18C8-4802-A597-835F9C0DBFDD}" type="datetimeFigureOut">
               <a:rPr lang="en-US" smtClean="0"/>
-              <a:t>10/29/2013</a:t>
+              <a:t>10/30/2013</a:t>
             </a:fld>
             <a:endParaRPr lang="en-US"/>
           </a:p>
@@ -3653,7 +3653,7 @@
           <a:p>
             <a:fld id="{C1C164F1-18C8-4802-A597-835F9C0DBFDD}" type="datetimeFigureOut">
               <a:rPr lang="en-US" smtClean="0"/>
-              <a:t>10/29/2013</a:t>
+              <a:t>10/30/2013</a:t>
             </a:fld>
             <a:endParaRPr lang="en-US"/>
           </a:p>
@@ -4161,7 +4161,7 @@
         </p:nvSpPr>
         <p:spPr>
           <a:xfrm>
-            <a:off x="1447800" y="381000"/>
+            <a:off x="1438239" y="381000"/>
             <a:ext cx="7406640" cy="917682"/>
           </a:xfrm>
         </p:spPr>
@@ -4208,11 +4208,7 @@
             <a:pPr algn="ctr"/>
             <a:r>
               <a:rPr lang="en-US" dirty="0" smtClean="0"/>
-              <a:t>Iteration </a:t>
-            </a:r>
-            <a:r>
-              <a:rPr lang="en-US" dirty="0" smtClean="0"/>
-              <a:t>2</a:t>
+              <a:t>Iteration 2</a:t>
             </a:r>
             <a:endParaRPr lang="en-US" dirty="0"/>
           </a:p>
@@ -4380,6 +4376,36 @@
           </a:p>
         </p:txBody>
       </p:sp>
+      <p:pic>
+        <p:nvPicPr>
+          <p:cNvPr id="5" name="Picture 4"/>
+          <p:cNvPicPr>
+            <a:picLocks noChangeAspect="1"/>
+          </p:cNvPicPr>
+          <p:nvPr/>
+        </p:nvPicPr>
+        <p:blipFill>
+          <a:blip r:embed="rId2" cstate="print">
+            <a:extLst>
+              <a:ext uri="{28A0092B-C50C-407E-A947-70E740481C1C}">
+                <a14:useLocalDpi xmlns:a14="http://schemas.microsoft.com/office/drawing/2010/main" val="0"/>
+              </a:ext>
+            </a:extLst>
+          </a:blip>
+          <a:stretch>
+            <a:fillRect/>
+          </a:stretch>
+        </p:blipFill>
+        <p:spPr>
+          <a:xfrm>
+            <a:off x="4159828" y="4267200"/>
+            <a:ext cx="2295180" cy="1905000"/>
+          </a:xfrm>
+          <a:prstGeom prst="rect">
+            <a:avLst/>
+          </a:prstGeom>
+        </p:spPr>
+      </p:pic>
     </p:spTree>
     <p:extLst>
       <p:ext uri="{BB962C8B-B14F-4D97-AF65-F5344CB8AC3E}">
@@ -4462,16 +4488,42 @@
           <a:p>
             <a:r>
               <a:rPr lang="en-US" dirty="0" smtClean="0"/>
-              <a:t>Iteration </a:t>
-            </a:r>
-            <a:r>
-              <a:rPr lang="en-US" dirty="0" smtClean="0"/>
-              <a:t>2:  The goals of this iteration involved creating the Android UI, receiving GPS coordinates and driving the robot to them, integrating 3 sensors, avoiding cliffs, and driving in a straight line</a:t>
+              <a:t>Iteration 2:  The goals of this iteration involved creating the Android UI, receiving GPS coordinates and driving the robot to them, integrating 3 sensors, avoiding cliffs, and driving in a straight line</a:t>
             </a:r>
             <a:endParaRPr lang="en-US" dirty="0"/>
           </a:p>
         </p:txBody>
       </p:sp>
+      <p:pic>
+        <p:nvPicPr>
+          <p:cNvPr id="4" name="Picture 3"/>
+          <p:cNvPicPr>
+            <a:picLocks noChangeAspect="1"/>
+          </p:cNvPicPr>
+          <p:nvPr/>
+        </p:nvPicPr>
+        <p:blipFill>
+          <a:blip r:embed="rId2" cstate="print">
+            <a:extLst>
+              <a:ext uri="{28A0092B-C50C-407E-A947-70E740481C1C}">
+                <a14:useLocalDpi xmlns:a14="http://schemas.microsoft.com/office/drawing/2010/main" val="0"/>
+              </a:ext>
+            </a:extLst>
+          </a:blip>
+          <a:stretch>
+            <a:fillRect/>
+          </a:stretch>
+        </p:blipFill>
+        <p:spPr>
+          <a:xfrm>
+            <a:off x="3352800" y="4038600"/>
+            <a:ext cx="3352800" cy="2514600"/>
+          </a:xfrm>
+          <a:prstGeom prst="rect">
+            <a:avLst/>
+          </a:prstGeom>
+        </p:spPr>
+      </p:pic>
     </p:spTree>
     <p:extLst>
       <p:ext uri="{BB962C8B-B14F-4D97-AF65-F5344CB8AC3E}">
@@ -4560,7 +4612,6 @@
               <a:rPr lang="en-US" dirty="0" smtClean="0"/>
               <a:t>Communication was set up between the tablet, phone, and the VEX</a:t>
             </a:r>
-            <a:endParaRPr lang="en-US" dirty="0" smtClean="0"/>
           </a:p>
           <a:p>
             <a:r>
@@ -4577,7 +4628,17 @@
           <a:p>
             <a:r>
               <a:rPr lang="en-US" dirty="0" smtClean="0"/>
-              <a:t>GPS locations</a:t>
+              <a:t>GPS </a:t>
+            </a:r>
+            <a:r>
+              <a:rPr lang="en-US" dirty="0" smtClean="0"/>
+              <a:t>locations</a:t>
+            </a:r>
+          </a:p>
+          <a:p>
+            <a:r>
+              <a:rPr lang="en-US" dirty="0" smtClean="0"/>
+              <a:t>Forward Fix</a:t>
             </a:r>
             <a:endParaRPr lang="en-US" dirty="0" smtClean="0"/>
           </a:p>
@@ -4589,6 +4650,35 @@
           </a:p>
         </p:txBody>
       </p:sp>
+      <p:pic>
+        <p:nvPicPr>
+          <p:cNvPr id="4" name="Picture 3"/>
+          <p:cNvPicPr>
+            <a:picLocks noChangeAspect="1"/>
+          </p:cNvPicPr>
+          <p:nvPr/>
+        </p:nvPicPr>
+        <p:blipFill rotWithShape="1">
+          <a:blip r:embed="rId2" cstate="print">
+            <a:extLst>
+              <a:ext uri="{28A0092B-C50C-407E-A947-70E740481C1C}">
+                <a14:useLocalDpi xmlns:a14="http://schemas.microsoft.com/office/drawing/2010/main" val="0"/>
+              </a:ext>
+            </a:extLst>
+          </a:blip>
+          <a:srcRect r="2718" b="3480"/>
+          <a:stretch/>
+        </p:blipFill>
+        <p:spPr>
+          <a:xfrm>
+            <a:off x="6553199" y="4343400"/>
+            <a:ext cx="2292671" cy="2362200"/>
+          </a:xfrm>
+          <a:prstGeom prst="diamond">
+            <a:avLst/>
+          </a:prstGeom>
+        </p:spPr>
+      </p:pic>
     </p:spTree>
     <p:extLst>
       <p:ext uri="{BB962C8B-B14F-4D97-AF65-F5344CB8AC3E}">
@@ -4675,21 +4765,18 @@
               <a:rPr lang="en-US" dirty="0" smtClean="0"/>
               <a:t>Bump Sensor</a:t>
             </a:r>
-            <a:endParaRPr lang="en-US" dirty="0" smtClean="0"/>
           </a:p>
           <a:p>
             <a:r>
               <a:rPr lang="en-US" dirty="0" smtClean="0"/>
               <a:t>Communication</a:t>
             </a:r>
-            <a:endParaRPr lang="en-US" dirty="0" smtClean="0"/>
           </a:p>
           <a:p>
             <a:r>
               <a:rPr lang="en-US" dirty="0" smtClean="0"/>
               <a:t>Ultrasonic sensor</a:t>
             </a:r>
-            <a:endParaRPr lang="en-US" dirty="0" smtClean="0"/>
           </a:p>
           <a:p>
             <a:r>
@@ -4822,13 +4909,28 @@
           <a:p>
             <a:r>
               <a:rPr lang="en-US" dirty="0" smtClean="0"/>
-              <a:t>Retrieving bearing</a:t>
-            </a:r>
-          </a:p>
-          <a:p>
+              <a:t>Retrieving </a:t>
+            </a:r>
             <a:r>
               <a:rPr lang="en-US" dirty="0" smtClean="0"/>
-              <a:t>USB powered VEX</a:t>
+              <a:t>heading</a:t>
+            </a:r>
+            <a:endParaRPr lang="en-US" dirty="0" smtClean="0"/>
+          </a:p>
+          <a:p>
+            <a:r>
+              <a:rPr lang="en-US" dirty="0" smtClean="0"/>
+              <a:t>USB powered </a:t>
+            </a:r>
+            <a:r>
+              <a:rPr lang="en-US" dirty="0" smtClean="0"/>
+              <a:t>VEX</a:t>
+            </a:r>
+          </a:p>
+          <a:p>
+            <a:r>
+              <a:rPr lang="en-US" dirty="0" smtClean="0"/>
+              <a:t>Limit sensor with cracks</a:t>
             </a:r>
             <a:endParaRPr lang="en-US" dirty="0" smtClean="0"/>
           </a:p>
@@ -4963,7 +5065,15 @@
           <a:p>
             <a:r>
               <a:rPr lang="en-US" dirty="0" smtClean="0"/>
-              <a:t>Finding outdoor power outlets is challenging </a:t>
+              <a:t>Finding outdoor power </a:t>
+            </a:r>
+            <a:r>
+              <a:rPr lang="en-US" dirty="0" smtClean="0"/>
+              <a:t>outlets and testing outside </a:t>
+            </a:r>
+            <a:r>
+              <a:rPr lang="en-US" dirty="0" smtClean="0"/>
+              <a:t>is challenging </a:t>
             </a:r>
           </a:p>
           <a:p>
@@ -4971,6 +5081,36 @@
           </a:p>
         </p:txBody>
       </p:sp>
+      <p:pic>
+        <p:nvPicPr>
+          <p:cNvPr id="4" name="Picture 3"/>
+          <p:cNvPicPr>
+            <a:picLocks noChangeAspect="1"/>
+          </p:cNvPicPr>
+          <p:nvPr/>
+        </p:nvPicPr>
+        <p:blipFill>
+          <a:blip r:embed="rId2">
+            <a:extLst>
+              <a:ext uri="{28A0092B-C50C-407E-A947-70E740481C1C}">
+                <a14:useLocalDpi xmlns:a14="http://schemas.microsoft.com/office/drawing/2010/main" val="0"/>
+              </a:ext>
+            </a:extLst>
+          </a:blip>
+          <a:stretch>
+            <a:fillRect/>
+          </a:stretch>
+        </p:blipFill>
+        <p:spPr>
+          <a:xfrm>
+            <a:off x="3200400" y="4193540"/>
+            <a:ext cx="4191000" cy="2207260"/>
+          </a:xfrm>
+          <a:prstGeom prst="rect">
+            <a:avLst/>
+          </a:prstGeom>
+        </p:spPr>
+      </p:pic>
     </p:spTree>
     <p:extLst>
       <p:ext uri="{BB962C8B-B14F-4D97-AF65-F5344CB8AC3E}">

</xml_diff>